<commit_message>
Clean up license strings
</commit_message>
<xml_diff>
--- a/docs/package_overview.pptx
+++ b/docs/package_overview.pptx
@@ -288,7 +288,7 @@
           <a:p>
             <a:fld id="{31DED3DF-D5BF-E24F-A1C2-CA07FC12AD49}" type="datetimeFigureOut">
               <a:rPr lang="en-US" smtClean="0"/>
-              <a:t>17/02/16</a:t>
+              <a:t>21/09/16</a:t>
             </a:fld>
             <a:endParaRPr lang="en-US"/>
           </a:p>
@@ -458,7 +458,7 @@
           <a:p>
             <a:fld id="{31DED3DF-D5BF-E24F-A1C2-CA07FC12AD49}" type="datetimeFigureOut">
               <a:rPr lang="en-US" smtClean="0"/>
-              <a:t>17/02/16</a:t>
+              <a:t>21/09/16</a:t>
             </a:fld>
             <a:endParaRPr lang="en-US"/>
           </a:p>
@@ -638,7 +638,7 @@
           <a:p>
             <a:fld id="{31DED3DF-D5BF-E24F-A1C2-CA07FC12AD49}" type="datetimeFigureOut">
               <a:rPr lang="en-US" smtClean="0"/>
-              <a:t>17/02/16</a:t>
+              <a:t>21/09/16</a:t>
             </a:fld>
             <a:endParaRPr lang="en-US"/>
           </a:p>
@@ -808,7 +808,7 @@
           <a:p>
             <a:fld id="{31DED3DF-D5BF-E24F-A1C2-CA07FC12AD49}" type="datetimeFigureOut">
               <a:rPr lang="en-US" smtClean="0"/>
-              <a:t>17/02/16</a:t>
+              <a:t>21/09/16</a:t>
             </a:fld>
             <a:endParaRPr lang="en-US"/>
           </a:p>
@@ -1054,7 +1054,7 @@
           <a:p>
             <a:fld id="{31DED3DF-D5BF-E24F-A1C2-CA07FC12AD49}" type="datetimeFigureOut">
               <a:rPr lang="en-US" smtClean="0"/>
-              <a:t>17/02/16</a:t>
+              <a:t>21/09/16</a:t>
             </a:fld>
             <a:endParaRPr lang="en-US"/>
           </a:p>
@@ -1342,7 +1342,7 @@
           <a:p>
             <a:fld id="{31DED3DF-D5BF-E24F-A1C2-CA07FC12AD49}" type="datetimeFigureOut">
               <a:rPr lang="en-US" smtClean="0"/>
-              <a:t>17/02/16</a:t>
+              <a:t>21/09/16</a:t>
             </a:fld>
             <a:endParaRPr lang="en-US"/>
           </a:p>
@@ -1764,7 +1764,7 @@
           <a:p>
             <a:fld id="{31DED3DF-D5BF-E24F-A1C2-CA07FC12AD49}" type="datetimeFigureOut">
               <a:rPr lang="en-US" smtClean="0"/>
-              <a:t>17/02/16</a:t>
+              <a:t>21/09/16</a:t>
             </a:fld>
             <a:endParaRPr lang="en-US"/>
           </a:p>
@@ -1882,7 +1882,7 @@
           <a:p>
             <a:fld id="{31DED3DF-D5BF-E24F-A1C2-CA07FC12AD49}" type="datetimeFigureOut">
               <a:rPr lang="en-US" smtClean="0"/>
-              <a:t>17/02/16</a:t>
+              <a:t>21/09/16</a:t>
             </a:fld>
             <a:endParaRPr lang="en-US"/>
           </a:p>
@@ -1977,7 +1977,7 @@
           <a:p>
             <a:fld id="{31DED3DF-D5BF-E24F-A1C2-CA07FC12AD49}" type="datetimeFigureOut">
               <a:rPr lang="en-US" smtClean="0"/>
-              <a:t>17/02/16</a:t>
+              <a:t>21/09/16</a:t>
             </a:fld>
             <a:endParaRPr lang="en-US"/>
           </a:p>
@@ -2254,7 +2254,7 @@
           <a:p>
             <a:fld id="{31DED3DF-D5BF-E24F-A1C2-CA07FC12AD49}" type="datetimeFigureOut">
               <a:rPr lang="en-US" smtClean="0"/>
-              <a:t>17/02/16</a:t>
+              <a:t>21/09/16</a:t>
             </a:fld>
             <a:endParaRPr lang="en-US"/>
           </a:p>
@@ -2507,7 +2507,7 @@
           <a:p>
             <a:fld id="{31DED3DF-D5BF-E24F-A1C2-CA07FC12AD49}" type="datetimeFigureOut">
               <a:rPr lang="en-US" smtClean="0"/>
-              <a:t>17/02/16</a:t>
+              <a:t>21/09/16</a:t>
             </a:fld>
             <a:endParaRPr lang="en-US"/>
           </a:p>
@@ -2720,7 +2720,7 @@
           <a:p>
             <a:fld id="{31DED3DF-D5BF-E24F-A1C2-CA07FC12AD49}" type="datetimeFigureOut">
               <a:rPr lang="en-US" smtClean="0"/>
-              <a:t>17/02/16</a:t>
+              <a:t>21/09/16</a:t>
             </a:fld>
             <a:endParaRPr lang="en-US"/>
           </a:p>
@@ -3109,6 +3109,20 @@
           <a:prstGeom prst="rect">
             <a:avLst/>
           </a:prstGeom>
+          <a:solidFill>
+            <a:schemeClr val="bg1">
+              <a:lumMod val="95000"/>
+            </a:schemeClr>
+          </a:solidFill>
+          <a:ln w="12700">
+            <a:solidFill>
+              <a:schemeClr val="tx1">
+                <a:lumMod val="50000"/>
+                <a:lumOff val="50000"/>
+              </a:schemeClr>
+            </a:solidFill>
+          </a:ln>
+          <a:effectLst/>
         </p:spPr>
         <p:style>
           <a:lnRef idx="1">
@@ -3151,6 +3165,18 @@
           <a:prstGeom prst="roundRect">
             <a:avLst/>
           </a:prstGeom>
+          <a:solidFill>
+            <a:schemeClr val="tx2">
+              <a:lumMod val="20000"/>
+              <a:lumOff val="80000"/>
+            </a:schemeClr>
+          </a:solidFill>
+          <a:ln w="12700">
+            <a:solidFill>
+              <a:schemeClr val="accent1"/>
+            </a:solidFill>
+          </a:ln>
+          <a:effectLst/>
         </p:spPr>
         <p:style>
           <a:lnRef idx="1">
@@ -3193,6 +3219,18 @@
           <a:prstGeom prst="roundRect">
             <a:avLst/>
           </a:prstGeom>
+          <a:solidFill>
+            <a:schemeClr val="tx2">
+              <a:lumMod val="20000"/>
+              <a:lumOff val="80000"/>
+            </a:schemeClr>
+          </a:solidFill>
+          <a:ln w="12700">
+            <a:solidFill>
+              <a:schemeClr val="accent1"/>
+            </a:solidFill>
+          </a:ln>
+          <a:effectLst/>
         </p:spPr>
         <p:style>
           <a:lnRef idx="1">
@@ -3235,6 +3273,20 @@
           <a:prstGeom prst="rect">
             <a:avLst/>
           </a:prstGeom>
+          <a:solidFill>
+            <a:schemeClr val="bg1">
+              <a:lumMod val="95000"/>
+            </a:schemeClr>
+          </a:solidFill>
+          <a:ln w="12700">
+            <a:solidFill>
+              <a:schemeClr val="tx1">
+                <a:lumMod val="50000"/>
+                <a:lumOff val="50000"/>
+              </a:schemeClr>
+            </a:solidFill>
+          </a:ln>
+          <a:effectLst/>
         </p:spPr>
         <p:style>
           <a:lnRef idx="1">
@@ -3277,6 +3329,18 @@
           <a:prstGeom prst="roundRect">
             <a:avLst/>
           </a:prstGeom>
+          <a:solidFill>
+            <a:schemeClr val="tx2">
+              <a:lumMod val="20000"/>
+              <a:lumOff val="80000"/>
+            </a:schemeClr>
+          </a:solidFill>
+          <a:ln w="12700">
+            <a:solidFill>
+              <a:schemeClr val="accent1"/>
+            </a:solidFill>
+          </a:ln>
+          <a:effectLst/>
         </p:spPr>
         <p:style>
           <a:lnRef idx="1">
@@ -3319,6 +3383,18 @@
           <a:prstGeom prst="roundRect">
             <a:avLst/>
           </a:prstGeom>
+          <a:solidFill>
+            <a:schemeClr val="tx2">
+              <a:lumMod val="20000"/>
+              <a:lumOff val="80000"/>
+            </a:schemeClr>
+          </a:solidFill>
+          <a:ln w="12700">
+            <a:solidFill>
+              <a:schemeClr val="accent1"/>
+            </a:solidFill>
+          </a:ln>
+          <a:effectLst/>
         </p:spPr>
         <p:style>
           <a:lnRef idx="1">
@@ -3361,6 +3437,18 @@
           <a:prstGeom prst="roundRect">
             <a:avLst/>
           </a:prstGeom>
+          <a:solidFill>
+            <a:schemeClr val="tx2">
+              <a:lumMod val="20000"/>
+              <a:lumOff val="80000"/>
+            </a:schemeClr>
+          </a:solidFill>
+          <a:ln w="12700">
+            <a:solidFill>
+              <a:schemeClr val="accent1"/>
+            </a:solidFill>
+          </a:ln>
+          <a:effectLst/>
         </p:spPr>
         <p:style>
           <a:lnRef idx="1">
@@ -3409,6 +3497,7 @@
             </a:solidFill>
             <a:tailEnd type="arrow"/>
           </a:ln>
+          <a:effectLst/>
         </p:spPr>
         <p:style>
           <a:lnRef idx="2">
@@ -3445,6 +3534,7 @@
             </a:solidFill>
             <a:tailEnd type="arrow"/>
           </a:ln>
+          <a:effectLst/>
         </p:spPr>
         <p:style>
           <a:lnRef idx="2">
@@ -3475,6 +3565,20 @@
           <a:prstGeom prst="rect">
             <a:avLst/>
           </a:prstGeom>
+          <a:solidFill>
+            <a:schemeClr val="bg1">
+              <a:lumMod val="95000"/>
+            </a:schemeClr>
+          </a:solidFill>
+          <a:ln w="12700">
+            <a:solidFill>
+              <a:schemeClr val="tx1">
+                <a:lumMod val="50000"/>
+                <a:lumOff val="50000"/>
+              </a:schemeClr>
+            </a:solidFill>
+          </a:ln>
+          <a:effectLst/>
         </p:spPr>
         <p:style>
           <a:lnRef idx="1">
@@ -3517,6 +3621,18 @@
           <a:prstGeom prst="roundRect">
             <a:avLst/>
           </a:prstGeom>
+          <a:solidFill>
+            <a:schemeClr val="tx2">
+              <a:lumMod val="20000"/>
+              <a:lumOff val="80000"/>
+            </a:schemeClr>
+          </a:solidFill>
+          <a:ln w="12700">
+            <a:solidFill>
+              <a:schemeClr val="accent1"/>
+            </a:solidFill>
+          </a:ln>
+          <a:effectLst/>
         </p:spPr>
         <p:style>
           <a:lnRef idx="1">
@@ -3554,11 +3670,23 @@
         <p:spPr>
           <a:xfrm>
             <a:off x="5859051" y="6162116"/>
-            <a:ext cx="1339678" cy="363303"/>
+            <a:ext cx="822385" cy="363303"/>
           </a:xfrm>
           <a:prstGeom prst="roundRect">
             <a:avLst/>
           </a:prstGeom>
+          <a:solidFill>
+            <a:schemeClr val="tx2">
+              <a:lumMod val="20000"/>
+              <a:lumOff val="80000"/>
+            </a:schemeClr>
+          </a:solidFill>
+          <a:ln w="12700">
+            <a:solidFill>
+              <a:schemeClr val="accent1"/>
+            </a:solidFill>
+          </a:ln>
+          <a:effectLst/>
         </p:spPr>
         <p:style>
           <a:lnRef idx="1">
@@ -3580,8 +3708,8 @@
           <a:p>
             <a:pPr algn="ctr"/>
             <a:r>
-              <a:rPr lang="en-US" sz="1600" dirty="0" err="1" smtClean="0"/>
-              <a:t>GLPKSolver</a:t>
+              <a:rPr lang="en-US" sz="1600" dirty="0" smtClean="0"/>
+              <a:t>CPLEX</a:t>
             </a:r>
             <a:endParaRPr lang="en-US" sz="1600" dirty="0"/>
           </a:p>
@@ -3595,12 +3723,24 @@
         </p:nvSpPr>
         <p:spPr>
           <a:xfrm>
-            <a:off x="7400686" y="6162116"/>
-            <a:ext cx="1446302" cy="363303"/>
+            <a:off x="6882657" y="6162116"/>
+            <a:ext cx="935474" cy="363303"/>
           </a:xfrm>
           <a:prstGeom prst="roundRect">
             <a:avLst/>
           </a:prstGeom>
+          <a:solidFill>
+            <a:schemeClr val="tx2">
+              <a:lumMod val="20000"/>
+              <a:lumOff val="80000"/>
+            </a:schemeClr>
+          </a:solidFill>
+          <a:ln w="12700">
+            <a:solidFill>
+              <a:schemeClr val="accent1"/>
+            </a:solidFill>
+          </a:ln>
+          <a:effectLst/>
         </p:spPr>
         <p:style>
           <a:lnRef idx="1">
@@ -3623,7 +3763,7 @@
             <a:pPr algn="ctr"/>
             <a:r>
               <a:rPr lang="en-US" sz="1600" dirty="0" err="1" smtClean="0"/>
-              <a:t>GurobiSolver</a:t>
+              <a:t>Gurobi</a:t>
             </a:r>
             <a:endParaRPr lang="en-US" sz="1600" dirty="0"/>
           </a:p>
@@ -3637,8 +3777,8 @@
         </p:nvCxnSpPr>
         <p:spPr>
           <a:xfrm flipV="1">
-            <a:off x="6681436" y="5749363"/>
-            <a:ext cx="366371" cy="353211"/>
+            <a:off x="6336990" y="5749364"/>
+            <a:ext cx="527631" cy="332926"/>
           </a:xfrm>
           <a:prstGeom prst="straightConnector1">
             <a:avLst/>
@@ -3649,6 +3789,7 @@
             </a:solidFill>
             <a:tailEnd type="arrow"/>
           </a:ln>
+          <a:effectLst/>
         </p:spPr>
         <p:style>
           <a:lnRef idx="2">
@@ -3673,8 +3814,8 @@
         </p:nvCxnSpPr>
         <p:spPr>
           <a:xfrm flipH="1" flipV="1">
-            <a:off x="7527543" y="5749364"/>
-            <a:ext cx="250608" cy="353210"/>
+            <a:off x="7742201" y="5721982"/>
+            <a:ext cx="529749" cy="360308"/>
           </a:xfrm>
           <a:prstGeom prst="straightConnector1">
             <a:avLst/>
@@ -3685,6 +3826,7 @@
             </a:solidFill>
             <a:tailEnd type="arrow"/>
           </a:ln>
+          <a:effectLst/>
         </p:spPr>
         <p:style>
           <a:lnRef idx="2">
@@ -3724,6 +3866,7 @@
             <a:headEnd type="none"/>
             <a:tailEnd type="triangle" w="med" len="med"/>
           </a:ln>
+          <a:effectLst/>
         </p:spPr>
         <p:style>
           <a:lnRef idx="2">
@@ -3763,6 +3906,7 @@
             <a:headEnd type="none"/>
             <a:tailEnd type="triangle" w="med" len="med"/>
           </a:ln>
+          <a:effectLst/>
         </p:spPr>
         <p:style>
           <a:lnRef idx="2">
@@ -3793,6 +3937,20 @@
           <a:prstGeom prst="rect">
             <a:avLst/>
           </a:prstGeom>
+          <a:solidFill>
+            <a:schemeClr val="bg1">
+              <a:lumMod val="95000"/>
+            </a:schemeClr>
+          </a:solidFill>
+          <a:ln w="12700">
+            <a:solidFill>
+              <a:schemeClr val="tx1">
+                <a:lumMod val="50000"/>
+                <a:lumOff val="50000"/>
+              </a:schemeClr>
+            </a:solidFill>
+          </a:ln>
+          <a:effectLst/>
         </p:spPr>
         <p:style>
           <a:lnRef idx="1">
@@ -3829,12 +3987,26 @@
         </p:nvSpPr>
         <p:spPr>
           <a:xfrm>
-            <a:off x="183183" y="1233311"/>
+            <a:off x="183183" y="1265643"/>
             <a:ext cx="4197257" cy="3419850"/>
           </a:xfrm>
           <a:prstGeom prst="rect">
             <a:avLst/>
           </a:prstGeom>
+          <a:solidFill>
+            <a:schemeClr val="bg1">
+              <a:lumMod val="95000"/>
+            </a:schemeClr>
+          </a:solidFill>
+          <a:ln w="12700">
+            <a:solidFill>
+              <a:schemeClr val="tx1">
+                <a:lumMod val="50000"/>
+                <a:lumOff val="50000"/>
+              </a:schemeClr>
+            </a:solidFill>
+          </a:ln>
+          <a:effectLst/>
         </p:spPr>
         <p:style>
           <a:lnRef idx="1">
@@ -3879,6 +4051,18 @@
               <a:gd name="adj" fmla="val 8280"/>
             </a:avLst>
           </a:prstGeom>
+          <a:solidFill>
+            <a:schemeClr val="tx2">
+              <a:lumMod val="20000"/>
+              <a:lumOff val="80000"/>
+            </a:schemeClr>
+          </a:solidFill>
+          <a:ln w="12700">
+            <a:solidFill>
+              <a:schemeClr val="accent1"/>
+            </a:solidFill>
+          </a:ln>
+          <a:effectLst/>
         </p:spPr>
         <p:style>
           <a:lnRef idx="1">
@@ -3991,6 +4175,18 @@
               <a:gd name="adj" fmla="val 10404"/>
             </a:avLst>
           </a:prstGeom>
+          <a:solidFill>
+            <a:schemeClr val="tx2">
+              <a:lumMod val="20000"/>
+              <a:lumOff val="80000"/>
+            </a:schemeClr>
+          </a:solidFill>
+          <a:ln w="12700">
+            <a:solidFill>
+              <a:schemeClr val="accent1"/>
+            </a:solidFill>
+          </a:ln>
+          <a:effectLst/>
         </p:spPr>
         <p:style>
           <a:lnRef idx="1">
@@ -4057,6 +4253,18 @@
               <a:gd name="adj" fmla="val 10404"/>
             </a:avLst>
           </a:prstGeom>
+          <a:solidFill>
+            <a:schemeClr val="tx2">
+              <a:lumMod val="20000"/>
+              <a:lumOff val="80000"/>
+            </a:schemeClr>
+          </a:solidFill>
+          <a:ln w="12700">
+            <a:solidFill>
+              <a:schemeClr val="accent1"/>
+            </a:solidFill>
+          </a:ln>
+          <a:effectLst/>
         </p:spPr>
         <p:style>
           <a:lnRef idx="1">
@@ -4124,6 +4332,18 @@
               <a:gd name="adj" fmla="val 10404"/>
             </a:avLst>
           </a:prstGeom>
+          <a:solidFill>
+            <a:schemeClr val="tx2">
+              <a:lumMod val="20000"/>
+              <a:lumOff val="80000"/>
+            </a:schemeClr>
+          </a:solidFill>
+          <a:ln w="12700">
+            <a:solidFill>
+              <a:schemeClr val="accent1"/>
+            </a:solidFill>
+          </a:ln>
+          <a:effectLst/>
         </p:spPr>
         <p:style>
           <a:lnRef idx="1">
@@ -4180,6 +4400,18 @@
               <a:gd name="adj" fmla="val 10404"/>
             </a:avLst>
           </a:prstGeom>
+          <a:solidFill>
+            <a:schemeClr val="tx2">
+              <a:lumMod val="20000"/>
+              <a:lumOff val="80000"/>
+            </a:schemeClr>
+          </a:solidFill>
+          <a:ln w="12700">
+            <a:solidFill>
+              <a:schemeClr val="accent1"/>
+            </a:solidFill>
+          </a:ln>
+          <a:effectLst/>
         </p:spPr>
         <p:style>
           <a:lnRef idx="1">
@@ -4238,12 +4470,26 @@
         </p:nvSpPr>
         <p:spPr>
           <a:xfrm>
-            <a:off x="183184" y="195376"/>
+            <a:off x="183184" y="227708"/>
             <a:ext cx="4197257" cy="854770"/>
           </a:xfrm>
           <a:prstGeom prst="rect">
             <a:avLst/>
           </a:prstGeom>
+          <a:solidFill>
+            <a:schemeClr val="bg1">
+              <a:lumMod val="95000"/>
+            </a:schemeClr>
+          </a:solidFill>
+          <a:ln w="12700">
+            <a:solidFill>
+              <a:schemeClr val="tx1">
+                <a:lumMod val="50000"/>
+                <a:lumOff val="50000"/>
+              </a:schemeClr>
+            </a:solidFill>
+          </a:ln>
+          <a:effectLst/>
         </p:spPr>
         <p:style>
           <a:lnRef idx="1">
@@ -4286,6 +4532,18 @@
           <a:prstGeom prst="roundRect">
             <a:avLst/>
           </a:prstGeom>
+          <a:solidFill>
+            <a:schemeClr val="tx2">
+              <a:lumMod val="20000"/>
+              <a:lumOff val="80000"/>
+            </a:schemeClr>
+          </a:solidFill>
+          <a:ln w="12700">
+            <a:solidFill>
+              <a:schemeClr val="accent1"/>
+            </a:solidFill>
+          </a:ln>
+          <a:effectLst/>
         </p:spPr>
         <p:style>
           <a:lnRef idx="1">
@@ -4328,6 +4586,18 @@
           <a:prstGeom prst="roundRect">
             <a:avLst/>
           </a:prstGeom>
+          <a:solidFill>
+            <a:schemeClr val="tx2">
+              <a:lumMod val="20000"/>
+              <a:lumOff val="80000"/>
+            </a:schemeClr>
+          </a:solidFill>
+          <a:ln w="12700">
+            <a:solidFill>
+              <a:schemeClr val="accent1"/>
+            </a:solidFill>
+          </a:ln>
+          <a:effectLst/>
         </p:spPr>
         <p:style>
           <a:lnRef idx="1">
@@ -4370,6 +4640,20 @@
           <a:prstGeom prst="rect">
             <a:avLst/>
           </a:prstGeom>
+          <a:solidFill>
+            <a:schemeClr val="bg1">
+              <a:lumMod val="95000"/>
+            </a:schemeClr>
+          </a:solidFill>
+          <a:ln w="12700">
+            <a:solidFill>
+              <a:schemeClr val="tx1">
+                <a:lumMod val="50000"/>
+                <a:lumOff val="50000"/>
+              </a:schemeClr>
+            </a:solidFill>
+          </a:ln>
+          <a:effectLst/>
         </p:spPr>
         <p:style>
           <a:lnRef idx="1">
@@ -4412,6 +4696,18 @@
           <a:prstGeom prst="roundRect">
             <a:avLst/>
           </a:prstGeom>
+          <a:solidFill>
+            <a:schemeClr val="tx2">
+              <a:lumMod val="20000"/>
+              <a:lumOff val="80000"/>
+            </a:schemeClr>
+          </a:solidFill>
+          <a:ln w="12700">
+            <a:solidFill>
+              <a:schemeClr val="accent1"/>
+            </a:solidFill>
+          </a:ln>
+          <a:effectLst/>
         </p:spPr>
         <p:style>
           <a:lnRef idx="1">
@@ -4456,6 +4752,18 @@
               <a:gd name="adj" fmla="val 8280"/>
             </a:avLst>
           </a:prstGeom>
+          <a:solidFill>
+            <a:schemeClr val="tx2">
+              <a:lumMod val="20000"/>
+              <a:lumOff val="80000"/>
+            </a:schemeClr>
+          </a:solidFill>
+          <a:ln w="12700">
+            <a:solidFill>
+              <a:schemeClr val="accent1"/>
+            </a:solidFill>
+          </a:ln>
+          <a:effectLst/>
         </p:spPr>
         <p:style>
           <a:lnRef idx="1">
@@ -4520,6 +4828,20 @@
           <a:prstGeom prst="rect">
             <a:avLst/>
           </a:prstGeom>
+          <a:solidFill>
+            <a:schemeClr val="bg1">
+              <a:lumMod val="95000"/>
+            </a:schemeClr>
+          </a:solidFill>
+          <a:ln w="12700">
+            <a:solidFill>
+              <a:schemeClr val="tx1">
+                <a:lumMod val="50000"/>
+                <a:lumOff val="50000"/>
+              </a:schemeClr>
+            </a:solidFill>
+          </a:ln>
+          <a:effectLst/>
         </p:spPr>
         <p:style>
           <a:lnRef idx="1">
@@ -4563,6 +4885,18 @@
               <a:gd name="adj" fmla="val 8280"/>
             </a:avLst>
           </a:prstGeom>
+          <a:solidFill>
+            <a:schemeClr val="tx2">
+              <a:lumMod val="20000"/>
+              <a:lumOff val="80000"/>
+            </a:schemeClr>
+          </a:solidFill>
+          <a:ln w="12700">
+            <a:solidFill>
+              <a:schemeClr val="accent1"/>
+            </a:solidFill>
+          </a:ln>
+          <a:effectLst/>
         </p:spPr>
         <p:style>
           <a:lnRef idx="1">
@@ -4631,6 +4965,18 @@
               <a:gd name="adj" fmla="val 8280"/>
             </a:avLst>
           </a:prstGeom>
+          <a:solidFill>
+            <a:schemeClr val="tx2">
+              <a:lumMod val="20000"/>
+              <a:lumOff val="80000"/>
+            </a:schemeClr>
+          </a:solidFill>
+          <a:ln w="12700">
+            <a:solidFill>
+              <a:schemeClr val="accent1"/>
+            </a:solidFill>
+          </a:ln>
+          <a:effectLst/>
         </p:spPr>
         <p:style>
           <a:lnRef idx="1">
@@ -4690,6 +5036,20 @@
           <a:prstGeom prst="rect">
             <a:avLst/>
           </a:prstGeom>
+          <a:solidFill>
+            <a:schemeClr val="bg1">
+              <a:lumMod val="95000"/>
+            </a:schemeClr>
+          </a:solidFill>
+          <a:ln w="12700">
+            <a:solidFill>
+              <a:schemeClr val="tx1">
+                <a:lumMod val="50000"/>
+                <a:lumOff val="50000"/>
+              </a:schemeClr>
+            </a:solidFill>
+          </a:ln>
+          <a:effectLst/>
         </p:spPr>
         <p:style>
           <a:lnRef idx="1">
@@ -4732,6 +5092,18 @@
           <a:prstGeom prst="roundRect">
             <a:avLst/>
           </a:prstGeom>
+          <a:solidFill>
+            <a:schemeClr val="tx2">
+              <a:lumMod val="20000"/>
+              <a:lumOff val="80000"/>
+            </a:schemeClr>
+          </a:solidFill>
+          <a:ln w="12700">
+            <a:solidFill>
+              <a:schemeClr val="accent1"/>
+            </a:solidFill>
+          </a:ln>
+          <a:effectLst/>
         </p:spPr>
         <p:style>
           <a:lnRef idx="1">
@@ -4774,6 +5146,18 @@
           <a:prstGeom prst="roundRect">
             <a:avLst/>
           </a:prstGeom>
+          <a:solidFill>
+            <a:schemeClr val="tx2">
+              <a:lumMod val="20000"/>
+              <a:lumOff val="80000"/>
+            </a:schemeClr>
+          </a:solidFill>
+          <a:ln w="12700">
+            <a:solidFill>
+              <a:schemeClr val="accent1"/>
+            </a:solidFill>
+          </a:ln>
+          <a:effectLst/>
         </p:spPr>
         <p:style>
           <a:lnRef idx="1">
@@ -4818,6 +5202,18 @@
               <a:gd name="adj" fmla="val 8280"/>
             </a:avLst>
           </a:prstGeom>
+          <a:solidFill>
+            <a:schemeClr val="tx2">
+              <a:lumMod val="20000"/>
+              <a:lumOff val="80000"/>
+            </a:schemeClr>
+          </a:solidFill>
+          <a:ln w="12700">
+            <a:solidFill>
+              <a:schemeClr val="accent1"/>
+            </a:solidFill>
+          </a:ln>
+          <a:effectLst/>
         </p:spPr>
         <p:style>
           <a:lnRef idx="1">
@@ -4882,6 +5278,18 @@
           <a:prstGeom prst="roundRect">
             <a:avLst/>
           </a:prstGeom>
+          <a:solidFill>
+            <a:schemeClr val="tx2">
+              <a:lumMod val="20000"/>
+              <a:lumOff val="80000"/>
+            </a:schemeClr>
+          </a:solidFill>
+          <a:ln w="12700">
+            <a:solidFill>
+              <a:schemeClr val="accent1"/>
+            </a:solidFill>
+          </a:ln>
+          <a:effectLst/>
         </p:spPr>
         <p:style>
           <a:lnRef idx="1">
@@ -4924,6 +5332,18 @@
           <a:prstGeom prst="roundRect">
             <a:avLst/>
           </a:prstGeom>
+          <a:solidFill>
+            <a:schemeClr val="tx2">
+              <a:lumMod val="20000"/>
+              <a:lumOff val="80000"/>
+            </a:schemeClr>
+          </a:solidFill>
+          <a:ln w="12700">
+            <a:solidFill>
+              <a:schemeClr val="accent1"/>
+            </a:solidFill>
+          </a:ln>
+          <a:effectLst/>
         </p:spPr>
         <p:style>
           <a:lnRef idx="1">
@@ -4965,6 +5385,18 @@
           <a:prstGeom prst="roundRect">
             <a:avLst/>
           </a:prstGeom>
+          <a:solidFill>
+            <a:schemeClr val="tx2">
+              <a:lumMod val="20000"/>
+              <a:lumOff val="80000"/>
+            </a:schemeClr>
+          </a:solidFill>
+          <a:ln w="12700">
+            <a:solidFill>
+              <a:schemeClr val="accent1"/>
+            </a:solidFill>
+          </a:ln>
+          <a:effectLst/>
         </p:spPr>
         <p:style>
           <a:lnRef idx="1">
@@ -4992,6 +5424,97 @@
           </a:p>
         </p:txBody>
       </p:sp>
+      <p:sp>
+        <p:nvSpPr>
+          <p:cNvPr id="42" name="Rounded Rectangle 41"/>
+          <p:cNvSpPr/>
+          <p:nvPr/>
+        </p:nvSpPr>
+        <p:spPr>
+          <a:xfrm>
+            <a:off x="8015673" y="6164065"/>
+            <a:ext cx="822385" cy="363303"/>
+          </a:xfrm>
+          <a:prstGeom prst="roundRect">
+            <a:avLst/>
+          </a:prstGeom>
+          <a:solidFill>
+            <a:schemeClr val="tx2">
+              <a:lumMod val="20000"/>
+              <a:lumOff val="80000"/>
+            </a:schemeClr>
+          </a:solidFill>
+          <a:ln w="12700">
+            <a:solidFill>
+              <a:schemeClr val="accent1"/>
+            </a:solidFill>
+          </a:ln>
+          <a:effectLst/>
+        </p:spPr>
+        <p:style>
+          <a:lnRef idx="1">
+            <a:schemeClr val="dk1"/>
+          </a:lnRef>
+          <a:fillRef idx="2">
+            <a:schemeClr val="dk1"/>
+          </a:fillRef>
+          <a:effectRef idx="1">
+            <a:schemeClr val="dk1"/>
+          </a:effectRef>
+          <a:fontRef idx="minor">
+            <a:schemeClr val="dk1"/>
+          </a:fontRef>
+        </p:style>
+        <p:txBody>
+          <a:bodyPr rtlCol="0" anchor="ctr"/>
+          <a:lstStyle/>
+          <a:p>
+            <a:pPr algn="ctr"/>
+            <a:r>
+              <a:rPr lang="en-US" sz="1600" dirty="0" smtClean="0"/>
+              <a:t>GLPK</a:t>
+            </a:r>
+            <a:endParaRPr lang="en-US" sz="1600" dirty="0"/>
+          </a:p>
+        </p:txBody>
+      </p:sp>
+      <p:cxnSp>
+        <p:nvCxnSpPr>
+          <p:cNvPr id="53" name="Straight Arrow Connector 52"/>
+          <p:cNvCxnSpPr/>
+          <p:nvPr/>
+        </p:nvCxnSpPr>
+        <p:spPr>
+          <a:xfrm flipH="1" flipV="1">
+            <a:off x="7313341" y="5736789"/>
+            <a:ext cx="1861" cy="332926"/>
+          </a:xfrm>
+          <a:prstGeom prst="straightConnector1">
+            <a:avLst/>
+          </a:prstGeom>
+          <a:ln>
+            <a:solidFill>
+              <a:srgbClr val="000000"/>
+            </a:solidFill>
+            <a:tailEnd type="arrow"/>
+          </a:ln>
+          <a:effectLst/>
+        </p:spPr>
+        <p:style>
+          <a:lnRef idx="2">
+            <a:schemeClr val="accent1"/>
+          </a:lnRef>
+          <a:fillRef idx="0">
+            <a:schemeClr val="accent1"/>
+          </a:fillRef>
+          <a:effectRef idx="1">
+            <a:schemeClr val="accent1"/>
+          </a:effectRef>
+          <a:fontRef idx="minor">
+            <a:schemeClr val="tx1"/>
+          </a:fontRef>
+        </p:style>
+      </p:cxnSp>
     </p:spTree>
     <p:extLst>
       <p:ext uri="{BB962C8B-B14F-4D97-AF65-F5344CB8AC3E}">

</xml_diff>